<commit_message>
Site updated: 2019-10-27 10:04:32
</commit_message>
<xml_diff>
--- a/10047/流程图.pptx
+++ b/10047/流程图.pptx
@@ -288,7 +288,8 @@
           <a:p>
             <a:fld id="{C8834E52-CD57-41EE-BEF5-9481E58FC16C}" type="datetimeFigureOut">
               <a:rPr lang="zh-CN" altLang="en-US" smtClean="0"/>
-              <a:t>2019/9/7</a:t>
+              <a:pPr/>
+              <a:t>2019/10/1</a:t>
             </a:fld>
             <a:endParaRPr lang="zh-CN" altLang="en-US"/>
           </a:p>
@@ -330,6 +331,7 @@
           <a:p>
             <a:fld id="{5BB85FE4-3E27-499E-A17B-091D19395062}" type="slidenum">
               <a:rPr lang="zh-CN" altLang="en-US" smtClean="0"/>
+              <a:pPr/>
               <a:t>‹#›</a:t>
             </a:fld>
             <a:endParaRPr lang="zh-CN" altLang="en-US"/>
@@ -453,7 +455,8 @@
           <a:p>
             <a:fld id="{C8834E52-CD57-41EE-BEF5-9481E58FC16C}" type="datetimeFigureOut">
               <a:rPr lang="zh-CN" altLang="en-US" smtClean="0"/>
-              <a:t>2019/9/7</a:t>
+              <a:pPr/>
+              <a:t>2019/10/1</a:t>
             </a:fld>
             <a:endParaRPr lang="zh-CN" altLang="en-US"/>
           </a:p>
@@ -495,6 +498,7 @@
           <a:p>
             <a:fld id="{5BB85FE4-3E27-499E-A17B-091D19395062}" type="slidenum">
               <a:rPr lang="zh-CN" altLang="en-US" smtClean="0"/>
+              <a:pPr/>
               <a:t>‹#›</a:t>
             </a:fld>
             <a:endParaRPr lang="zh-CN" altLang="en-US"/>
@@ -628,7 +632,8 @@
           <a:p>
             <a:fld id="{C8834E52-CD57-41EE-BEF5-9481E58FC16C}" type="datetimeFigureOut">
               <a:rPr lang="zh-CN" altLang="en-US" smtClean="0"/>
-              <a:t>2019/9/7</a:t>
+              <a:pPr/>
+              <a:t>2019/10/1</a:t>
             </a:fld>
             <a:endParaRPr lang="zh-CN" altLang="en-US"/>
           </a:p>
@@ -670,6 +675,7 @@
           <a:p>
             <a:fld id="{5BB85FE4-3E27-499E-A17B-091D19395062}" type="slidenum">
               <a:rPr lang="zh-CN" altLang="en-US" smtClean="0"/>
+              <a:pPr/>
               <a:t>‹#›</a:t>
             </a:fld>
             <a:endParaRPr lang="zh-CN" altLang="en-US"/>
@@ -793,7 +799,8 @@
           <a:p>
             <a:fld id="{C8834E52-CD57-41EE-BEF5-9481E58FC16C}" type="datetimeFigureOut">
               <a:rPr lang="zh-CN" altLang="en-US" smtClean="0"/>
-              <a:t>2019/9/7</a:t>
+              <a:pPr/>
+              <a:t>2019/10/1</a:t>
             </a:fld>
             <a:endParaRPr lang="zh-CN" altLang="en-US"/>
           </a:p>
@@ -835,6 +842,7 @@
           <a:p>
             <a:fld id="{5BB85FE4-3E27-499E-A17B-091D19395062}" type="slidenum">
               <a:rPr lang="zh-CN" altLang="en-US" smtClean="0"/>
+              <a:pPr/>
               <a:t>‹#›</a:t>
             </a:fld>
             <a:endParaRPr lang="zh-CN" altLang="en-US"/>
@@ -1034,7 +1042,8 @@
           <a:p>
             <a:fld id="{C8834E52-CD57-41EE-BEF5-9481E58FC16C}" type="datetimeFigureOut">
               <a:rPr lang="zh-CN" altLang="en-US" smtClean="0"/>
-              <a:t>2019/9/7</a:t>
+              <a:pPr/>
+              <a:t>2019/10/1</a:t>
             </a:fld>
             <a:endParaRPr lang="zh-CN" altLang="en-US"/>
           </a:p>
@@ -1076,6 +1085,7 @@
           <a:p>
             <a:fld id="{5BB85FE4-3E27-499E-A17B-091D19395062}" type="slidenum">
               <a:rPr lang="zh-CN" altLang="en-US" smtClean="0"/>
+              <a:pPr/>
               <a:t>‹#›</a:t>
             </a:fld>
             <a:endParaRPr lang="zh-CN" altLang="en-US"/>
@@ -1317,7 +1327,8 @@
           <a:p>
             <a:fld id="{C8834E52-CD57-41EE-BEF5-9481E58FC16C}" type="datetimeFigureOut">
               <a:rPr lang="zh-CN" altLang="en-US" smtClean="0"/>
-              <a:t>2019/9/7</a:t>
+              <a:pPr/>
+              <a:t>2019/10/1</a:t>
             </a:fld>
             <a:endParaRPr lang="zh-CN" altLang="en-US"/>
           </a:p>
@@ -1359,6 +1370,7 @@
           <a:p>
             <a:fld id="{5BB85FE4-3E27-499E-A17B-091D19395062}" type="slidenum">
               <a:rPr lang="zh-CN" altLang="en-US" smtClean="0"/>
+              <a:pPr/>
               <a:t>‹#›</a:t>
             </a:fld>
             <a:endParaRPr lang="zh-CN" altLang="en-US"/>
@@ -1734,7 +1746,8 @@
           <a:p>
             <a:fld id="{C8834E52-CD57-41EE-BEF5-9481E58FC16C}" type="datetimeFigureOut">
               <a:rPr lang="zh-CN" altLang="en-US" smtClean="0"/>
-              <a:t>2019/9/7</a:t>
+              <a:pPr/>
+              <a:t>2019/10/1</a:t>
             </a:fld>
             <a:endParaRPr lang="zh-CN" altLang="en-US"/>
           </a:p>
@@ -1776,6 +1789,7 @@
           <a:p>
             <a:fld id="{5BB85FE4-3E27-499E-A17B-091D19395062}" type="slidenum">
               <a:rPr lang="zh-CN" altLang="en-US" smtClean="0"/>
+              <a:pPr/>
               <a:t>‹#›</a:t>
             </a:fld>
             <a:endParaRPr lang="zh-CN" altLang="en-US"/>
@@ -1847,7 +1861,8 @@
           <a:p>
             <a:fld id="{C8834E52-CD57-41EE-BEF5-9481E58FC16C}" type="datetimeFigureOut">
               <a:rPr lang="zh-CN" altLang="en-US" smtClean="0"/>
-              <a:t>2019/9/7</a:t>
+              <a:pPr/>
+              <a:t>2019/10/1</a:t>
             </a:fld>
             <a:endParaRPr lang="zh-CN" altLang="en-US"/>
           </a:p>
@@ -1889,6 +1904,7 @@
           <a:p>
             <a:fld id="{5BB85FE4-3E27-499E-A17B-091D19395062}" type="slidenum">
               <a:rPr lang="zh-CN" altLang="en-US" smtClean="0"/>
+              <a:pPr/>
               <a:t>‹#›</a:t>
             </a:fld>
             <a:endParaRPr lang="zh-CN" altLang="en-US"/>
@@ -1937,7 +1953,8 @@
           <a:p>
             <a:fld id="{C8834E52-CD57-41EE-BEF5-9481E58FC16C}" type="datetimeFigureOut">
               <a:rPr lang="zh-CN" altLang="en-US" smtClean="0"/>
-              <a:t>2019/9/7</a:t>
+              <a:pPr/>
+              <a:t>2019/10/1</a:t>
             </a:fld>
             <a:endParaRPr lang="zh-CN" altLang="en-US"/>
           </a:p>
@@ -1979,6 +1996,7 @@
           <a:p>
             <a:fld id="{5BB85FE4-3E27-499E-A17B-091D19395062}" type="slidenum">
               <a:rPr lang="zh-CN" altLang="en-US" smtClean="0"/>
+              <a:pPr/>
               <a:t>‹#›</a:t>
             </a:fld>
             <a:endParaRPr lang="zh-CN" altLang="en-US"/>
@@ -2209,7 +2227,8 @@
           <a:p>
             <a:fld id="{C8834E52-CD57-41EE-BEF5-9481E58FC16C}" type="datetimeFigureOut">
               <a:rPr lang="zh-CN" altLang="en-US" smtClean="0"/>
-              <a:t>2019/9/7</a:t>
+              <a:pPr/>
+              <a:t>2019/10/1</a:t>
             </a:fld>
             <a:endParaRPr lang="zh-CN" altLang="en-US"/>
           </a:p>
@@ -2251,6 +2270,7 @@
           <a:p>
             <a:fld id="{5BB85FE4-3E27-499E-A17B-091D19395062}" type="slidenum">
               <a:rPr lang="zh-CN" altLang="en-US" smtClean="0"/>
+              <a:pPr/>
               <a:t>‹#›</a:t>
             </a:fld>
             <a:endParaRPr lang="zh-CN" altLang="en-US"/>
@@ -2457,7 +2477,8 @@
           <a:p>
             <a:fld id="{C8834E52-CD57-41EE-BEF5-9481E58FC16C}" type="datetimeFigureOut">
               <a:rPr lang="zh-CN" altLang="en-US" smtClean="0"/>
-              <a:t>2019/9/7</a:t>
+              <a:pPr/>
+              <a:t>2019/10/1</a:t>
             </a:fld>
             <a:endParaRPr lang="zh-CN" altLang="en-US"/>
           </a:p>
@@ -2499,6 +2520,7 @@
           <a:p>
             <a:fld id="{5BB85FE4-3E27-499E-A17B-091D19395062}" type="slidenum">
               <a:rPr lang="zh-CN" altLang="en-US" smtClean="0"/>
+              <a:pPr/>
               <a:t>‹#›</a:t>
             </a:fld>
             <a:endParaRPr lang="zh-CN" altLang="en-US"/>
@@ -2665,7 +2687,8 @@
           <a:p>
             <a:fld id="{C8834E52-CD57-41EE-BEF5-9481E58FC16C}" type="datetimeFigureOut">
               <a:rPr lang="zh-CN" altLang="en-US" smtClean="0"/>
-              <a:t>2019/9/7</a:t>
+              <a:pPr/>
+              <a:t>2019/10/1</a:t>
             </a:fld>
             <a:endParaRPr lang="zh-CN" altLang="en-US"/>
           </a:p>
@@ -2743,6 +2766,7 @@
           <a:p>
             <a:fld id="{5BB85FE4-3E27-499E-A17B-091D19395062}" type="slidenum">
               <a:rPr lang="zh-CN" altLang="en-US" smtClean="0"/>
+              <a:pPr/>
               <a:t>‹#›</a:t>
             </a:fld>
             <a:endParaRPr lang="zh-CN" altLang="en-US"/>
@@ -3072,26 +3096,97 @@
           <a:p>
             <a:pPr algn="ctr"/>
             <a:r>
-              <a:rPr lang="en-US" altLang="zh-CN" sz="2800" dirty="0" smtClean="0"/>
-              <a:t>Training set</a:t>
-            </a:r>
+              <a:rPr lang="zh-CN" altLang="en-US" sz="2800" dirty="0" smtClean="0"/>
+              <a:t>训练集</a:t>
+            </a:r>
+            <a:endParaRPr lang="en-US" altLang="zh-CN" sz="2800" dirty="0" smtClean="0"/>
           </a:p>
           <a:p>
             <a:r>
               <a:rPr lang="en-US" altLang="zh-CN" dirty="0" smtClean="0"/>
-              <a:t>X : “input” variable/feature</a:t>
-            </a:r>
-          </a:p>
-          <a:p>
+              <a:t>X : “</a:t>
+            </a:r>
+            <a:r>
+              <a:rPr lang="zh-CN" altLang="en-US" dirty="0" smtClean="0"/>
+              <a:t>输入</a:t>
+            </a:r>
             <a:r>
               <a:rPr lang="en-US" altLang="zh-CN" dirty="0" smtClean="0"/>
-              <a:t>Y : “output” variable / “target” variable</a:t>
-            </a:r>
-          </a:p>
-          <a:p>
+              <a:t>”</a:t>
+            </a:r>
+            <a:r>
+              <a:rPr lang="zh-CN" altLang="en-US" dirty="0" smtClean="0"/>
+              <a:t>变量</a:t>
+            </a:r>
             <a:r>
               <a:rPr lang="en-US" altLang="zh-CN" dirty="0" smtClean="0"/>
-              <a:t>m : number of training examples</a:t>
+              <a:t>/</a:t>
+            </a:r>
+            <a:r>
+              <a:rPr lang="zh-CN" altLang="en-US" dirty="0" smtClean="0"/>
+              <a:t>特征</a:t>
+            </a:r>
+            <a:endParaRPr lang="en-US" altLang="zh-CN" dirty="0" smtClean="0"/>
+          </a:p>
+          <a:p>
+            <a:r>
+              <a:rPr lang="en-US" altLang="zh-CN" dirty="0" smtClean="0"/>
+              <a:t>Y </a:t>
+            </a:r>
+            <a:r>
+              <a:rPr lang="en-US" altLang="zh-CN" dirty="0" smtClean="0"/>
+              <a:t>: </a:t>
+            </a:r>
+            <a:r>
+              <a:rPr lang="en-US" altLang="zh-CN" dirty="0" smtClean="0"/>
+              <a:t>“</a:t>
+            </a:r>
+            <a:r>
+              <a:rPr lang="zh-CN" altLang="en-US" dirty="0" smtClean="0"/>
+              <a:t>输出</a:t>
+            </a:r>
+            <a:r>
+              <a:rPr lang="en-US" altLang="zh-CN" dirty="0" smtClean="0"/>
+              <a:t>”</a:t>
+            </a:r>
+            <a:r>
+              <a:rPr lang="zh-CN" altLang="en-US" dirty="0" smtClean="0"/>
+              <a:t>变量</a:t>
+            </a:r>
+            <a:r>
+              <a:rPr lang="en-US" altLang="zh-CN" dirty="0" smtClean="0"/>
+              <a:t> </a:t>
+            </a:r>
+            <a:r>
+              <a:rPr lang="en-US" altLang="zh-CN" dirty="0" smtClean="0"/>
+              <a:t>/ </a:t>
+            </a:r>
+            <a:r>
+              <a:rPr lang="en-US" altLang="zh-CN" dirty="0" smtClean="0"/>
+              <a:t>“</a:t>
+            </a:r>
+            <a:r>
+              <a:rPr lang="zh-CN" altLang="en-US" dirty="0" smtClean="0"/>
+              <a:t>目标</a:t>
+            </a:r>
+            <a:r>
+              <a:rPr lang="en-US" altLang="zh-CN" dirty="0" smtClean="0"/>
+              <a:t>”</a:t>
+            </a:r>
+            <a:r>
+              <a:rPr lang="zh-CN" altLang="en-US" dirty="0" smtClean="0"/>
+              <a:t>变量</a:t>
+            </a:r>
+            <a:endParaRPr lang="en-US" altLang="zh-CN" dirty="0" smtClean="0"/>
+          </a:p>
+          <a:p>
+            <a:r>
+              <a:rPr lang="en-US" altLang="zh-CN" dirty="0" smtClean="0"/>
+              <a:t>m : </a:t>
+            </a:r>
+            <a:r>
+              <a:rPr lang="zh-CN" altLang="en-US" dirty="0" smtClean="0"/>
+              <a:t>训练数据的数量</a:t>
             </a:r>
             <a:endParaRPr lang="zh-CN" altLang="en-US" dirty="0"/>
           </a:p>
@@ -3174,8 +3269,12 @@
           <a:p>
             <a:pPr algn="ctr"/>
             <a:r>
-              <a:rPr lang="en-US" altLang="zh-CN" sz="2800" dirty="0" smtClean="0"/>
-              <a:t>Learning algorithm</a:t>
+              <a:rPr lang="zh-CN" altLang="en-US" sz="2800" dirty="0" smtClean="0"/>
+              <a:t>机</a:t>
+            </a:r>
+            <a:r>
+              <a:rPr lang="zh-CN" altLang="en-US" sz="2800" dirty="0" smtClean="0"/>
+              <a:t>器学习</a:t>
             </a:r>
             <a:endParaRPr lang="zh-CN" altLang="en-US" sz="2800" dirty="0"/>
           </a:p>
@@ -3218,8 +3317,12 @@
           <a:p>
             <a:pPr algn="ctr"/>
             <a:r>
-              <a:rPr lang="en-US" altLang="zh-CN" sz="2800" dirty="0" smtClean="0"/>
-              <a:t>hypothesis function</a:t>
+              <a:rPr lang="zh-CN" altLang="en-US" sz="2800" dirty="0" smtClean="0"/>
+              <a:t>预</a:t>
+            </a:r>
+            <a:r>
+              <a:rPr lang="zh-CN" altLang="en-US" sz="2800" dirty="0" smtClean="0"/>
+              <a:t>测函数</a:t>
             </a:r>
             <a:endParaRPr lang="zh-CN" altLang="en-US" sz="2800" dirty="0"/>
           </a:p>
@@ -3344,7 +3447,7 @@
         <p:spPr>
           <a:xfrm>
             <a:off x="6474056" y="5157192"/>
-            <a:ext cx="2058384" cy="584775"/>
+            <a:ext cx="1601721" cy="584775"/>
           </a:xfrm>
           <a:prstGeom prst="rect">
             <a:avLst/>
@@ -3358,8 +3461,12 @@
           <a:lstStyle/>
           <a:p>
             <a:r>
+              <a:rPr lang="zh-CN" altLang="en-US" sz="3200" dirty="0" smtClean="0"/>
+              <a:t>预测出</a:t>
+            </a:r>
+            <a:r>
               <a:rPr lang="en-US" altLang="zh-CN" sz="3200" dirty="0" smtClean="0"/>
-              <a:t>predicted y</a:t>
+              <a:t>y</a:t>
             </a:r>
             <a:endParaRPr lang="zh-CN" altLang="en-US" sz="3200" dirty="0"/>
           </a:p>

</xml_diff>